<commit_message>
Modifications based upon review
</commit_message>
<xml_diff>
--- a/assets/models/ManageLED_breadboard.pptx
+++ b/assets/models/ManageLED_breadboard.pptx
@@ -288,7 +288,7 @@
           <a:p>
             <a:fld id="{2039D583-C322-974B-A427-7996EC42ED25}" type="datetimeFigureOut">
               <a:rPr lang="en-US" smtClean="0"/>
-              <a:t>12/27/15</a:t>
+              <a:t>1/6/16</a:t>
             </a:fld>
             <a:endParaRPr lang="en-US"/>
           </a:p>
@@ -458,7 +458,7 @@
           <a:p>
             <a:fld id="{2039D583-C322-974B-A427-7996EC42ED25}" type="datetimeFigureOut">
               <a:rPr lang="en-US" smtClean="0"/>
-              <a:t>12/27/15</a:t>
+              <a:t>1/6/16</a:t>
             </a:fld>
             <a:endParaRPr lang="en-US"/>
           </a:p>
@@ -638,7 +638,7 @@
           <a:p>
             <a:fld id="{2039D583-C322-974B-A427-7996EC42ED25}" type="datetimeFigureOut">
               <a:rPr lang="en-US" smtClean="0"/>
-              <a:t>12/27/15</a:t>
+              <a:t>1/6/16</a:t>
             </a:fld>
             <a:endParaRPr lang="en-US"/>
           </a:p>
@@ -808,7 +808,7 @@
           <a:p>
             <a:fld id="{2039D583-C322-974B-A427-7996EC42ED25}" type="datetimeFigureOut">
               <a:rPr lang="en-US" smtClean="0"/>
-              <a:t>12/27/15</a:t>
+              <a:t>1/6/16</a:t>
             </a:fld>
             <a:endParaRPr lang="en-US"/>
           </a:p>
@@ -1054,7 +1054,7 @@
           <a:p>
             <a:fld id="{2039D583-C322-974B-A427-7996EC42ED25}" type="datetimeFigureOut">
               <a:rPr lang="en-US" smtClean="0"/>
-              <a:t>12/27/15</a:t>
+              <a:t>1/6/16</a:t>
             </a:fld>
             <a:endParaRPr lang="en-US"/>
           </a:p>
@@ -1342,7 +1342,7 @@
           <a:p>
             <a:fld id="{2039D583-C322-974B-A427-7996EC42ED25}" type="datetimeFigureOut">
               <a:rPr lang="en-US" smtClean="0"/>
-              <a:t>12/27/15</a:t>
+              <a:t>1/6/16</a:t>
             </a:fld>
             <a:endParaRPr lang="en-US"/>
           </a:p>
@@ -1764,7 +1764,7 @@
           <a:p>
             <a:fld id="{2039D583-C322-974B-A427-7996EC42ED25}" type="datetimeFigureOut">
               <a:rPr lang="en-US" smtClean="0"/>
-              <a:t>12/27/15</a:t>
+              <a:t>1/6/16</a:t>
             </a:fld>
             <a:endParaRPr lang="en-US"/>
           </a:p>
@@ -1882,7 +1882,7 @@
           <a:p>
             <a:fld id="{2039D583-C322-974B-A427-7996EC42ED25}" type="datetimeFigureOut">
               <a:rPr lang="en-US" smtClean="0"/>
-              <a:t>12/27/15</a:t>
+              <a:t>1/6/16</a:t>
             </a:fld>
             <a:endParaRPr lang="en-US"/>
           </a:p>
@@ -1977,7 +1977,7 @@
           <a:p>
             <a:fld id="{2039D583-C322-974B-A427-7996EC42ED25}" type="datetimeFigureOut">
               <a:rPr lang="en-US" smtClean="0"/>
-              <a:t>12/27/15</a:t>
+              <a:t>1/6/16</a:t>
             </a:fld>
             <a:endParaRPr lang="en-US"/>
           </a:p>
@@ -2254,7 +2254,7 @@
           <a:p>
             <a:fld id="{2039D583-C322-974B-A427-7996EC42ED25}" type="datetimeFigureOut">
               <a:rPr lang="en-US" smtClean="0"/>
-              <a:t>12/27/15</a:t>
+              <a:t>1/6/16</a:t>
             </a:fld>
             <a:endParaRPr lang="en-US"/>
           </a:p>
@@ -2507,7 +2507,7 @@
           <a:p>
             <a:fld id="{2039D583-C322-974B-A427-7996EC42ED25}" type="datetimeFigureOut">
               <a:rPr lang="en-US" smtClean="0"/>
-              <a:t>12/27/15</a:t>
+              <a:t>1/6/16</a:t>
             </a:fld>
             <a:endParaRPr lang="en-US"/>
           </a:p>
@@ -2720,7 +2720,7 @@
           <a:p>
             <a:fld id="{2039D583-C322-974B-A427-7996EC42ED25}" type="datetimeFigureOut">
               <a:rPr lang="en-US" smtClean="0"/>
-              <a:t>12/27/15</a:t>
+              <a:t>1/6/16</a:t>
             </a:fld>
             <a:endParaRPr lang="en-US"/>
           </a:p>
@@ -3095,6 +3095,85 @@
           <a:chExt cx="0" cy="0"/>
         </a:xfrm>
       </p:grpSpPr>
+      <p:cxnSp>
+        <p:nvCxnSpPr>
+          <p:cNvPr id="11" name="Straight Connector 10"/>
+          <p:cNvCxnSpPr/>
+          <p:nvPr/>
+        </p:nvCxnSpPr>
+        <p:spPr>
+          <a:xfrm>
+            <a:off x="4165301" y="4398208"/>
+            <a:ext cx="705832" cy="857155"/>
+          </a:xfrm>
+          <a:prstGeom prst="line">
+            <a:avLst/>
+          </a:prstGeom>
+          <a:ln>
+            <a:solidFill>
+              <a:srgbClr val="E46C0A"/>
+            </a:solidFill>
+          </a:ln>
+        </p:spPr>
+        <p:style>
+          <a:lnRef idx="2">
+            <a:schemeClr val="accent1"/>
+          </a:lnRef>
+          <a:fillRef idx="0">
+            <a:schemeClr val="accent1"/>
+          </a:fillRef>
+          <a:effectRef idx="1">
+            <a:schemeClr val="accent1"/>
+          </a:effectRef>
+          <a:fontRef idx="minor">
+            <a:schemeClr val="tx1"/>
+          </a:fontRef>
+        </p:style>
+      </p:cxnSp>
+      <p:sp>
+        <p:nvSpPr>
+          <p:cNvPr id="7" name="Rectangle 6"/>
+          <p:cNvSpPr/>
+          <p:nvPr/>
+        </p:nvSpPr>
+        <p:spPr>
+          <a:xfrm>
+            <a:off x="4871133" y="2923643"/>
+            <a:ext cx="538057" cy="2331720"/>
+          </a:xfrm>
+          <a:prstGeom prst="rect">
+            <a:avLst/>
+          </a:prstGeom>
+          <a:noFill/>
+          <a:ln w="19050" cmpd="sng">
+            <a:solidFill>
+              <a:srgbClr val="E46C0A"/>
+            </a:solidFill>
+          </a:ln>
+        </p:spPr>
+        <p:style>
+          <a:lnRef idx="1">
+            <a:schemeClr val="accent1"/>
+          </a:lnRef>
+          <a:fillRef idx="3">
+            <a:schemeClr val="accent1"/>
+          </a:fillRef>
+          <a:effectRef idx="2">
+            <a:schemeClr val="accent1"/>
+          </a:effectRef>
+          <a:fontRef idx="minor">
+            <a:schemeClr val="lt1"/>
+          </a:fontRef>
+        </p:style>
+        <p:txBody>
+          <a:bodyPr rtlCol="0" anchor="ctr"/>
+          <a:lstStyle/>
+          <a:p>
+            <a:pPr algn="ctr"/>
+            <a:endParaRPr lang="en-US"/>
+          </a:p>
+        </p:txBody>
+      </p:sp>
       <p:pic>
         <p:nvPicPr>
           <p:cNvPr id="2" name="Picture 1" descr="DB410c_breadboard.png"/>
@@ -3117,8 +3196,38 @@
         </p:blipFill>
         <p:spPr>
           <a:xfrm>
-            <a:off x="4931726" y="2381573"/>
-            <a:ext cx="410277" cy="2834640"/>
+            <a:off x="4986543" y="3002833"/>
+            <a:ext cx="317630" cy="2194560"/>
+          </a:xfrm>
+          <a:prstGeom prst="rect">
+            <a:avLst/>
+          </a:prstGeom>
+        </p:spPr>
+      </p:pic>
+      <p:pic>
+        <p:nvPicPr>
+          <p:cNvPr id="4" name="Picture 3"/>
+          <p:cNvPicPr>
+            <a:picLocks noChangeAspect="1"/>
+          </p:cNvPicPr>
+          <p:nvPr/>
+        </p:nvPicPr>
+        <p:blipFill>
+          <a:blip r:embed="rId3">
+            <a:extLst>
+              <a:ext uri="{28A0092B-C50C-407E-A947-70E740481C1C}">
+                <a14:useLocalDpi xmlns:a14="http://schemas.microsoft.com/office/drawing/2010/main" val="0"/>
+              </a:ext>
+            </a:extLst>
+          </a:blip>
+          <a:stretch>
+            <a:fillRect/>
+          </a:stretch>
+        </p:blipFill>
+        <p:spPr>
+          <a:xfrm>
+            <a:off x="4730708" y="2472936"/>
+            <a:ext cx="3992880" cy="3390180"/>
           </a:xfrm>
           <a:prstGeom prst="rect">
             <a:avLst/>
@@ -3134,7 +3243,7 @@
           <p:nvPr/>
         </p:nvPicPr>
         <p:blipFill>
-          <a:blip r:embed="rId3">
+          <a:blip r:embed="rId4">
             <a:extLst>
               <a:ext uri="{28A0092B-C50C-407E-A947-70E740481C1C}">
                 <a14:useLocalDpi xmlns:a14="http://schemas.microsoft.com/office/drawing/2010/main" val="0"/>
@@ -3172,7 +3281,9 @@
           <a:noFill/>
           <a:ln w="19050" cmpd="sng">
             <a:solidFill>
-              <a:srgbClr val="FF0000"/>
+              <a:schemeClr val="accent6">
+                <a:lumMod val="75000"/>
+              </a:schemeClr>
             </a:solidFill>
           </a:ln>
         </p:spPr>
@@ -3199,50 +3310,6 @@
           </a:p>
         </p:txBody>
       </p:sp>
-      <p:sp>
-        <p:nvSpPr>
-          <p:cNvPr id="7" name="Rectangle 6"/>
-          <p:cNvSpPr/>
-          <p:nvPr/>
-        </p:nvSpPr>
-        <p:spPr>
-          <a:xfrm>
-            <a:off x="4871133" y="2282095"/>
-            <a:ext cx="538057" cy="3042416"/>
-          </a:xfrm>
-          <a:prstGeom prst="rect">
-            <a:avLst/>
-          </a:prstGeom>
-          <a:noFill/>
-          <a:ln w="19050" cmpd="sng">
-            <a:solidFill>
-              <a:srgbClr val="FF0000"/>
-            </a:solidFill>
-          </a:ln>
-        </p:spPr>
-        <p:style>
-          <a:lnRef idx="1">
-            <a:schemeClr val="accent1"/>
-          </a:lnRef>
-          <a:fillRef idx="3">
-            <a:schemeClr val="accent1"/>
-          </a:fillRef>
-          <a:effectRef idx="2">
-            <a:schemeClr val="accent1"/>
-          </a:effectRef>
-          <a:fontRef idx="minor">
-            <a:schemeClr val="lt1"/>
-          </a:fontRef>
-        </p:style>
-        <p:txBody>
-          <a:bodyPr rtlCol="0" anchor="ctr"/>
-          <a:lstStyle/>
-          <a:p>
-            <a:pPr algn="ctr"/>
-            <a:endParaRPr lang="en-US"/>
-          </a:p>
-        </p:txBody>
-      </p:sp>
       <p:cxnSp>
         <p:nvCxnSpPr>
           <p:cNvPr id="9" name="Straight Connector 8"/>
@@ -3252,14 +3319,14 @@
         <p:spPr>
           <a:xfrm>
             <a:off x="4165301" y="2207842"/>
-            <a:ext cx="705832" cy="74253"/>
+            <a:ext cx="705832" cy="706665"/>
           </a:xfrm>
           <a:prstGeom prst="line">
             <a:avLst/>
           </a:prstGeom>
           <a:ln>
             <a:solidFill>
-              <a:srgbClr val="FF0000"/>
+              <a:srgbClr val="E46C0A"/>
             </a:solidFill>
           </a:ln>
         </p:spPr>
@@ -3278,71 +3345,6 @@
           </a:fontRef>
         </p:style>
       </p:cxnSp>
-      <p:cxnSp>
-        <p:nvCxnSpPr>
-          <p:cNvPr id="11" name="Straight Connector 10"/>
-          <p:cNvCxnSpPr/>
-          <p:nvPr/>
-        </p:nvCxnSpPr>
-        <p:spPr>
-          <a:xfrm>
-            <a:off x="4165301" y="4398208"/>
-            <a:ext cx="705832" cy="926303"/>
-          </a:xfrm>
-          <a:prstGeom prst="line">
-            <a:avLst/>
-          </a:prstGeom>
-          <a:ln>
-            <a:solidFill>
-              <a:srgbClr val="FF0000"/>
-            </a:solidFill>
-          </a:ln>
-        </p:spPr>
-        <p:style>
-          <a:lnRef idx="2">
-            <a:schemeClr val="accent1"/>
-          </a:lnRef>
-          <a:fillRef idx="0">
-            <a:schemeClr val="accent1"/>
-          </a:fillRef>
-          <a:effectRef idx="1">
-            <a:schemeClr val="accent1"/>
-          </a:effectRef>
-          <a:fontRef idx="minor">
-            <a:schemeClr val="tx1"/>
-          </a:fontRef>
-        </p:style>
-      </p:cxnSp>
-      <p:pic>
-        <p:nvPicPr>
-          <p:cNvPr id="4" name="Picture 3"/>
-          <p:cNvPicPr>
-            <a:picLocks noChangeAspect="1"/>
-          </p:cNvPicPr>
-          <p:nvPr/>
-        </p:nvPicPr>
-        <p:blipFill>
-          <a:blip r:embed="rId4">
-            <a:extLst>
-              <a:ext uri="{28A0092B-C50C-407E-A947-70E740481C1C}">
-                <a14:useLocalDpi xmlns:a14="http://schemas.microsoft.com/office/drawing/2010/main" val="0"/>
-              </a:ext>
-            </a:extLst>
-          </a:blip>
-          <a:stretch>
-            <a:fillRect/>
-          </a:stretch>
-        </p:blipFill>
-        <p:spPr>
-          <a:xfrm>
-            <a:off x="4931726" y="1689753"/>
-            <a:ext cx="3992880" cy="4428122"/>
-          </a:xfrm>
-          <a:prstGeom prst="rect">
-            <a:avLst/>
-          </a:prstGeom>
-        </p:spPr>
-      </p:pic>
     </p:spTree>
     <p:extLst>
       <p:ext uri="{BB962C8B-B14F-4D97-AF65-F5344CB8AC3E}">

</xml_diff>